<commit_message>
Added design patterns used to the powerpoint and a pdf version of the powerpoint
</commit_message>
<xml_diff>
--- a/Documentation/ToBeContinued Final Project.pptx
+++ b/Documentation/ToBeContinued Final Project.pptx
@@ -13,6 +13,8 @@
     <p:sldId id="270" r:id="rId7"/>
     <p:sldId id="271" r:id="rId8"/>
     <p:sldId id="272" r:id="rId9"/>
+    <p:sldId id="274" r:id="rId10"/>
+    <p:sldId id="273" r:id="rId11"/>
   </p:sldIdLst>
   <p:sldSz cx="9144000" cy="6858000" type="screen4x3"/>
   <p:notesSz cx="6858000" cy="9144000"/>
@@ -4770,6 +4772,90 @@
 </p:sld>
 </file>
 
+<file path=ppt/slides/slide10.xml><?xml version="1.0" encoding="utf-8"?>
+<p:sld xmlns:a="http://schemas.openxmlformats.org/drawingml/2006/main" xmlns:r="http://schemas.openxmlformats.org/officeDocument/2006/relationships" xmlns:p="http://schemas.openxmlformats.org/presentationml/2006/main">
+  <p:cSld>
+    <p:spTree>
+      <p:nvGrpSpPr>
+        <p:cNvPr id="1" name=""/>
+        <p:cNvGrpSpPr/>
+        <p:nvPr/>
+      </p:nvGrpSpPr>
+      <p:grpSpPr>
+        <a:xfrm>
+          <a:off x="0" y="0"/>
+          <a:ext cx="0" cy="0"/>
+          <a:chOff x="0" y="0"/>
+          <a:chExt cx="0" cy="0"/>
+        </a:xfrm>
+      </p:grpSpPr>
+      <p:sp>
+        <p:nvSpPr>
+          <p:cNvPr id="2" name="Title 1"/>
+          <p:cNvSpPr>
+            <a:spLocks noGrp="1"/>
+          </p:cNvSpPr>
+          <p:nvPr>
+            <p:ph type="title"/>
+          </p:nvPr>
+        </p:nvSpPr>
+        <p:spPr>
+          <a:xfrm>
+            <a:off x="426128" y="408373"/>
+            <a:ext cx="8260672" cy="734628"/>
+          </a:xfrm>
+        </p:spPr>
+        <p:txBody>
+          <a:bodyPr>
+            <a:normAutofit/>
+          </a:bodyPr>
+          <a:lstStyle/>
+          <a:p>
+            <a:r>
+              <a:rPr lang="en-US" sz="2800" dirty="0" smtClean="0"/>
+              <a:t>Factory Pattern</a:t>
+            </a:r>
+            <a:endParaRPr lang="en-US" sz="2800" dirty="0"/>
+          </a:p>
+        </p:txBody>
+      </p:sp>
+      <p:pic>
+        <p:nvPicPr>
+          <p:cNvPr id="3" name="Picture 2"/>
+          <p:cNvPicPr>
+            <a:picLocks noChangeAspect="1"/>
+          </p:cNvPicPr>
+          <p:nvPr/>
+        </p:nvPicPr>
+        <p:blipFill>
+          <a:blip r:embed="rId2"/>
+          <a:stretch>
+            <a:fillRect/>
+          </a:stretch>
+        </p:blipFill>
+        <p:spPr>
+          <a:xfrm>
+            <a:off x="1981200" y="1121811"/>
+            <a:ext cx="5399426" cy="5736189"/>
+          </a:xfrm>
+          <a:prstGeom prst="rect">
+            <a:avLst/>
+          </a:prstGeom>
+        </p:spPr>
+      </p:pic>
+    </p:spTree>
+    <p:extLst>
+      <p:ext uri="{BB962C8B-B14F-4D97-AF65-F5344CB8AC3E}">
+        <p14:creationId xmlns:p14="http://schemas.microsoft.com/office/powerpoint/2010/main" val="1821648748"/>
+      </p:ext>
+    </p:extLst>
+  </p:cSld>
+  <p:clrMapOvr>
+    <a:masterClrMapping/>
+  </p:clrMapOvr>
+</p:sld>
+</file>
+
 <file path=ppt/slides/slide2.xml><?xml version="1.0" encoding="utf-8"?>
 <p:sld xmlns:a="http://schemas.openxmlformats.org/drawingml/2006/main" xmlns:r="http://schemas.openxmlformats.org/officeDocument/2006/relationships" xmlns:p="http://schemas.openxmlformats.org/presentationml/2006/main">
   <p:cSld>
@@ -4875,11 +4961,7 @@
           <a:p>
             <a:r>
               <a:rPr lang="en-US" dirty="0" smtClean="0"/>
-              <a:t>Fall </a:t>
-            </a:r>
-            <a:r>
-              <a:rPr lang="en-US" dirty="0" smtClean="0"/>
-              <a:t>Quarter 2015</a:t>
+              <a:t>Fall Quarter 2015</a:t>
             </a:r>
             <a:endParaRPr lang="en-US" dirty="0"/>
           </a:p>
@@ -5411,6 +5493,90 @@
       </p:par>
     </p:tnLst>
   </p:timing>
+</p:sld>
+</file>
+
+<file path=ppt/slides/slide9.xml><?xml version="1.0" encoding="utf-8"?>
+<p:sld xmlns:a="http://schemas.openxmlformats.org/drawingml/2006/main" xmlns:r="http://schemas.openxmlformats.org/officeDocument/2006/relationships" xmlns:p="http://schemas.openxmlformats.org/presentationml/2006/main">
+  <p:cSld>
+    <p:spTree>
+      <p:nvGrpSpPr>
+        <p:cNvPr id="1" name=""/>
+        <p:cNvGrpSpPr/>
+        <p:nvPr/>
+      </p:nvGrpSpPr>
+      <p:grpSpPr>
+        <a:xfrm>
+          <a:off x="0" y="0"/>
+          <a:ext cx="0" cy="0"/>
+          <a:chOff x="0" y="0"/>
+          <a:chExt cx="0" cy="0"/>
+        </a:xfrm>
+      </p:grpSpPr>
+      <p:sp>
+        <p:nvSpPr>
+          <p:cNvPr id="2" name="Title 1"/>
+          <p:cNvSpPr>
+            <a:spLocks noGrp="1"/>
+          </p:cNvSpPr>
+          <p:nvPr>
+            <p:ph type="title"/>
+          </p:nvPr>
+        </p:nvSpPr>
+        <p:spPr>
+          <a:xfrm>
+            <a:off x="426128" y="408373"/>
+            <a:ext cx="8260672" cy="658428"/>
+          </a:xfrm>
+        </p:spPr>
+        <p:txBody>
+          <a:bodyPr>
+            <a:normAutofit/>
+          </a:bodyPr>
+          <a:lstStyle/>
+          <a:p>
+            <a:r>
+              <a:rPr lang="en-US" sz="2800" dirty="0" smtClean="0"/>
+              <a:t>NULL OBJECT PATTERN</a:t>
+            </a:r>
+            <a:endParaRPr lang="en-US" sz="2800" dirty="0"/>
+          </a:p>
+        </p:txBody>
+      </p:sp>
+      <p:pic>
+        <p:nvPicPr>
+          <p:cNvPr id="3" name="Picture 2"/>
+          <p:cNvPicPr>
+            <a:picLocks noChangeAspect="1"/>
+          </p:cNvPicPr>
+          <p:nvPr/>
+        </p:nvPicPr>
+        <p:blipFill>
+          <a:blip r:embed="rId2"/>
+          <a:stretch>
+            <a:fillRect/>
+          </a:stretch>
+        </p:blipFill>
+        <p:spPr>
+          <a:xfrm>
+            <a:off x="60664" y="1524000"/>
+            <a:ext cx="8991600" cy="4284953"/>
+          </a:xfrm>
+          <a:prstGeom prst="rect">
+            <a:avLst/>
+          </a:prstGeom>
+        </p:spPr>
+      </p:pic>
+    </p:spTree>
+    <p:extLst>
+      <p:ext uri="{BB962C8B-B14F-4D97-AF65-F5344CB8AC3E}">
+        <p14:creationId xmlns:p14="http://schemas.microsoft.com/office/powerpoint/2010/main" val="570090149"/>
+      </p:ext>
+    </p:extLst>
+  </p:cSld>
+  <p:clrMapOvr>
+    <a:masterClrMapping/>
+  </p:clrMapOvr>
 </p:sld>
 </file>
 

</xml_diff>